<commit_message>
Added the section 4
</commit_message>
<xml_diff>
--- a/others/LocalDeepSeekWithRAG/img/designDoc.pptx
+++ b/others/LocalDeepSeekWithRAG/img/designDoc.pptx
@@ -6,6 +6,7 @@
   </p:sldMasterIdLst>
   <p:sldIdLst>
     <p:sldId id="256" r:id="rId2"/>
+    <p:sldId id="257" r:id="rId3"/>
   </p:sldIdLst>
   <p:sldSz cx="12192000" cy="6858000"/>
   <p:notesSz cx="6858000" cy="9144000"/>
@@ -104,6 +105,11 @@
       </a:defRPr>
     </a:lvl9pPr>
   </p:defaultTextStyle>
+  <p:extLst>
+    <p:ext uri="{EFAFB233-063F-42B5-8137-9DF3F51BA10A}">
+      <p15:sldGuideLst xmlns:p15="http://schemas.microsoft.com/office/powerpoint/2012/main"/>
+    </p:ext>
+  </p:extLst>
 </p:presentation>
 </file>
 
@@ -256,7 +262,7 @@
           <a:p>
             <a:fld id="{0391740C-F5DB-44C2-ADD2-87011C5594EF}" type="datetimeFigureOut">
               <a:rPr lang="en-SG" smtClean="0"/>
-              <a:t>7/2/2025</a:t>
+              <a:t>8/2/2025</a:t>
             </a:fld>
             <a:endParaRPr lang="en-SG"/>
           </a:p>
@@ -456,7 +462,7 @@
           <a:p>
             <a:fld id="{0391740C-F5DB-44C2-ADD2-87011C5594EF}" type="datetimeFigureOut">
               <a:rPr lang="en-SG" smtClean="0"/>
-              <a:t>7/2/2025</a:t>
+              <a:t>8/2/2025</a:t>
             </a:fld>
             <a:endParaRPr lang="en-SG"/>
           </a:p>
@@ -666,7 +672,7 @@
           <a:p>
             <a:fld id="{0391740C-F5DB-44C2-ADD2-87011C5594EF}" type="datetimeFigureOut">
               <a:rPr lang="en-SG" smtClean="0"/>
-              <a:t>7/2/2025</a:t>
+              <a:t>8/2/2025</a:t>
             </a:fld>
             <a:endParaRPr lang="en-SG"/>
           </a:p>
@@ -866,7 +872,7 @@
           <a:p>
             <a:fld id="{0391740C-F5DB-44C2-ADD2-87011C5594EF}" type="datetimeFigureOut">
               <a:rPr lang="en-SG" smtClean="0"/>
-              <a:t>7/2/2025</a:t>
+              <a:t>8/2/2025</a:t>
             </a:fld>
             <a:endParaRPr lang="en-SG"/>
           </a:p>
@@ -1142,7 +1148,7 @@
           <a:p>
             <a:fld id="{0391740C-F5DB-44C2-ADD2-87011C5594EF}" type="datetimeFigureOut">
               <a:rPr lang="en-SG" smtClean="0"/>
-              <a:t>7/2/2025</a:t>
+              <a:t>8/2/2025</a:t>
             </a:fld>
             <a:endParaRPr lang="en-SG"/>
           </a:p>
@@ -1410,7 +1416,7 @@
           <a:p>
             <a:fld id="{0391740C-F5DB-44C2-ADD2-87011C5594EF}" type="datetimeFigureOut">
               <a:rPr lang="en-SG" smtClean="0"/>
-              <a:t>7/2/2025</a:t>
+              <a:t>8/2/2025</a:t>
             </a:fld>
             <a:endParaRPr lang="en-SG"/>
           </a:p>
@@ -1825,7 +1831,7 @@
           <a:p>
             <a:fld id="{0391740C-F5DB-44C2-ADD2-87011C5594EF}" type="datetimeFigureOut">
               <a:rPr lang="en-SG" smtClean="0"/>
-              <a:t>7/2/2025</a:t>
+              <a:t>8/2/2025</a:t>
             </a:fld>
             <a:endParaRPr lang="en-SG"/>
           </a:p>
@@ -1967,7 +1973,7 @@
           <a:p>
             <a:fld id="{0391740C-F5DB-44C2-ADD2-87011C5594EF}" type="datetimeFigureOut">
               <a:rPr lang="en-SG" smtClean="0"/>
-              <a:t>7/2/2025</a:t>
+              <a:t>8/2/2025</a:t>
             </a:fld>
             <a:endParaRPr lang="en-SG"/>
           </a:p>
@@ -2080,7 +2086,7 @@
           <a:p>
             <a:fld id="{0391740C-F5DB-44C2-ADD2-87011C5594EF}" type="datetimeFigureOut">
               <a:rPr lang="en-SG" smtClean="0"/>
-              <a:t>7/2/2025</a:t>
+              <a:t>8/2/2025</a:t>
             </a:fld>
             <a:endParaRPr lang="en-SG"/>
           </a:p>
@@ -2393,7 +2399,7 @@
           <a:p>
             <a:fld id="{0391740C-F5DB-44C2-ADD2-87011C5594EF}" type="datetimeFigureOut">
               <a:rPr lang="en-SG" smtClean="0"/>
-              <a:t>7/2/2025</a:t>
+              <a:t>8/2/2025</a:t>
             </a:fld>
             <a:endParaRPr lang="en-SG"/>
           </a:p>
@@ -2682,7 +2688,7 @@
           <a:p>
             <a:fld id="{0391740C-F5DB-44C2-ADD2-87011C5594EF}" type="datetimeFigureOut">
               <a:rPr lang="en-SG" smtClean="0"/>
-              <a:t>7/2/2025</a:t>
+              <a:t>8/2/2025</a:t>
             </a:fld>
             <a:endParaRPr lang="en-SG"/>
           </a:p>
@@ -2925,7 +2931,7 @@
           <a:p>
             <a:fld id="{0391740C-F5DB-44C2-ADD2-87011C5594EF}" type="datetimeFigureOut">
               <a:rPr lang="en-SG" smtClean="0"/>
-              <a:t>7/2/2025</a:t>
+              <a:t>8/2/2025</a:t>
             </a:fld>
             <a:endParaRPr lang="en-SG"/>
           </a:p>
@@ -5372,6 +5378,427 @@
 </p:sld>
 </file>
 
+<file path=ppt/slides/slide2.xml><?xml version="1.0" encoding="utf-8"?>
+<p:sld xmlns:a="http://schemas.openxmlformats.org/drawingml/2006/main" xmlns:r="http://schemas.openxmlformats.org/officeDocument/2006/relationships" xmlns:p="http://schemas.openxmlformats.org/presentationml/2006/main">
+  <p:cSld>
+    <p:spTree>
+      <p:nvGrpSpPr>
+        <p:cNvPr id="1" name=""/>
+        <p:cNvGrpSpPr/>
+        <p:nvPr/>
+      </p:nvGrpSpPr>
+      <p:grpSpPr>
+        <a:xfrm>
+          <a:off x="0" y="0"/>
+          <a:ext cx="0" cy="0"/>
+          <a:chOff x="0" y="0"/>
+          <a:chExt cx="0" cy="0"/>
+        </a:xfrm>
+      </p:grpSpPr>
+      <p:pic>
+        <p:nvPicPr>
+          <p:cNvPr id="5" name="Picture 4" descr="A screenshot of a computer&#10;&#10;AI-generated content may be incorrect.">
+            <a:extLst>
+              <a:ext uri="{FF2B5EF4-FFF2-40B4-BE49-F238E27FC236}">
+                <a16:creationId xmlns:a16="http://schemas.microsoft.com/office/drawing/2014/main" id="{5257D171-7581-B0DA-4F9A-50F0B3BDF501}"/>
+              </a:ext>
+            </a:extLst>
+          </p:cNvPr>
+          <p:cNvPicPr>
+            <a:picLocks noChangeAspect="1"/>
+          </p:cNvPicPr>
+          <p:nvPr/>
+        </p:nvPicPr>
+        <p:blipFill>
+          <a:blip r:embed="rId2">
+            <a:extLst>
+              <a:ext uri="{28A0092B-C50C-407E-A947-70E740481C1C}">
+                <a14:useLocalDpi xmlns:a14="http://schemas.microsoft.com/office/drawing/2010/main" val="0"/>
+              </a:ext>
+            </a:extLst>
+          </a:blip>
+          <a:srcRect l="33320" t="12351" r="8751" b="6947"/>
+          <a:stretch/>
+        </p:blipFill>
+        <p:spPr>
+          <a:xfrm>
+            <a:off x="6250164" y="301751"/>
+            <a:ext cx="5356534" cy="5746283"/>
+          </a:xfrm>
+          <a:prstGeom prst="rect">
+            <a:avLst/>
+          </a:prstGeom>
+        </p:spPr>
+      </p:pic>
+      <p:pic>
+        <p:nvPicPr>
+          <p:cNvPr id="7" name="Picture 6">
+            <a:extLst>
+              <a:ext uri="{FF2B5EF4-FFF2-40B4-BE49-F238E27FC236}">
+                <a16:creationId xmlns:a16="http://schemas.microsoft.com/office/drawing/2014/main" id="{0AFC798F-0C6B-9868-64E7-2B548AE3AA4C}"/>
+              </a:ext>
+            </a:extLst>
+          </p:cNvPr>
+          <p:cNvPicPr>
+            <a:picLocks noChangeAspect="1"/>
+          </p:cNvPicPr>
+          <p:nvPr/>
+        </p:nvPicPr>
+        <p:blipFill>
+          <a:blip r:embed="rId3"/>
+          <a:stretch>
+            <a:fillRect/>
+          </a:stretch>
+        </p:blipFill>
+        <p:spPr>
+          <a:xfrm>
+            <a:off x="862343" y="301751"/>
+            <a:ext cx="5268470" cy="3699280"/>
+          </a:xfrm>
+          <a:prstGeom prst="rect">
+            <a:avLst/>
+          </a:prstGeom>
+          <a:ln w="9525">
+            <a:solidFill>
+              <a:schemeClr val="tx1"/>
+            </a:solidFill>
+          </a:ln>
+        </p:spPr>
+      </p:pic>
+      <p:sp>
+        <p:nvSpPr>
+          <p:cNvPr id="8" name="Rectangle 7">
+            <a:extLst>
+              <a:ext uri="{FF2B5EF4-FFF2-40B4-BE49-F238E27FC236}">
+                <a16:creationId xmlns:a16="http://schemas.microsoft.com/office/drawing/2014/main" id="{29797ADB-5BF3-B055-21EC-EAD24942F40F}"/>
+              </a:ext>
+            </a:extLst>
+          </p:cNvPr>
+          <p:cNvSpPr/>
+          <p:nvPr/>
+        </p:nvSpPr>
+        <p:spPr>
+          <a:xfrm>
+            <a:off x="6748272" y="3063240"/>
+            <a:ext cx="3630168" cy="667512"/>
+          </a:xfrm>
+          <a:prstGeom prst="rect">
+            <a:avLst/>
+          </a:prstGeom>
+          <a:noFill/>
+          <a:ln w="28575">
+            <a:solidFill>
+              <a:srgbClr val="C00000"/>
+            </a:solidFill>
+            <a:prstDash val="sysDash"/>
+          </a:ln>
+        </p:spPr>
+        <p:style>
+          <a:lnRef idx="2">
+            <a:schemeClr val="accent1">
+              <a:shade val="15000"/>
+            </a:schemeClr>
+          </a:lnRef>
+          <a:fillRef idx="1">
+            <a:schemeClr val="accent1"/>
+          </a:fillRef>
+          <a:effectRef idx="0">
+            <a:schemeClr val="accent1"/>
+          </a:effectRef>
+          <a:fontRef idx="minor">
+            <a:schemeClr val="lt1"/>
+          </a:fontRef>
+        </p:style>
+        <p:txBody>
+          <a:bodyPr rtlCol="0" anchor="ctr"/>
+          <a:lstStyle/>
+          <a:p>
+            <a:pPr algn="ctr"/>
+            <a:endParaRPr lang="en-SG" dirty="0"/>
+          </a:p>
+        </p:txBody>
+      </p:sp>
+      <p:cxnSp>
+        <p:nvCxnSpPr>
+          <p:cNvPr id="10" name="Straight Arrow Connector 9">
+            <a:extLst>
+              <a:ext uri="{FF2B5EF4-FFF2-40B4-BE49-F238E27FC236}">
+                <a16:creationId xmlns:a16="http://schemas.microsoft.com/office/drawing/2014/main" id="{87D1FC39-CFED-2401-16C1-2F3F9823751E}"/>
+              </a:ext>
+            </a:extLst>
+          </p:cNvPr>
+          <p:cNvCxnSpPr>
+            <a:cxnSpLocks/>
+          </p:cNvCxnSpPr>
+          <p:nvPr/>
+        </p:nvCxnSpPr>
+        <p:spPr>
+          <a:xfrm flipH="1" flipV="1">
+            <a:off x="5623560" y="1764792"/>
+            <a:ext cx="1124712" cy="1664208"/>
+          </a:xfrm>
+          <a:prstGeom prst="straightConnector1">
+            <a:avLst/>
+          </a:prstGeom>
+          <a:ln>
+            <a:solidFill>
+              <a:srgbClr val="C00000"/>
+            </a:solidFill>
+            <a:tailEnd type="triangle"/>
+          </a:ln>
+        </p:spPr>
+        <p:style>
+          <a:lnRef idx="2">
+            <a:schemeClr val="accent1"/>
+          </a:lnRef>
+          <a:fillRef idx="0">
+            <a:schemeClr val="accent1"/>
+          </a:fillRef>
+          <a:effectRef idx="1">
+            <a:schemeClr val="accent1"/>
+          </a:effectRef>
+          <a:fontRef idx="minor">
+            <a:schemeClr val="tx1"/>
+          </a:fontRef>
+        </p:style>
+      </p:cxnSp>
+      <p:pic>
+        <p:nvPicPr>
+          <p:cNvPr id="13" name="Picture 12">
+            <a:extLst>
+              <a:ext uri="{FF2B5EF4-FFF2-40B4-BE49-F238E27FC236}">
+                <a16:creationId xmlns:a16="http://schemas.microsoft.com/office/drawing/2014/main" id="{13F3E314-3553-ECF2-55D0-256FE347ABDD}"/>
+              </a:ext>
+            </a:extLst>
+          </p:cNvPr>
+          <p:cNvPicPr>
+            <a:picLocks noChangeAspect="1"/>
+          </p:cNvPicPr>
+          <p:nvPr/>
+        </p:nvPicPr>
+        <p:blipFill>
+          <a:blip r:embed="rId4"/>
+          <a:srcRect b="22982"/>
+          <a:stretch/>
+        </p:blipFill>
+        <p:spPr>
+          <a:xfrm>
+            <a:off x="1053583" y="3186821"/>
+            <a:ext cx="5225863" cy="3369428"/>
+          </a:xfrm>
+          <a:prstGeom prst="rect">
+            <a:avLst/>
+          </a:prstGeom>
+          <a:ln w="6350">
+            <a:solidFill>
+              <a:schemeClr val="tx1"/>
+            </a:solidFill>
+          </a:ln>
+        </p:spPr>
+      </p:pic>
+      <p:sp>
+        <p:nvSpPr>
+          <p:cNvPr id="14" name="Rectangle 13">
+            <a:extLst>
+              <a:ext uri="{FF2B5EF4-FFF2-40B4-BE49-F238E27FC236}">
+                <a16:creationId xmlns:a16="http://schemas.microsoft.com/office/drawing/2014/main" id="{E1DB5774-09DB-309B-5039-1B963B7BF0AE}"/>
+              </a:ext>
+            </a:extLst>
+          </p:cNvPr>
+          <p:cNvSpPr/>
+          <p:nvPr/>
+        </p:nvSpPr>
+        <p:spPr>
+          <a:xfrm>
+            <a:off x="6748272" y="4001030"/>
+            <a:ext cx="3630168" cy="1147041"/>
+          </a:xfrm>
+          <a:prstGeom prst="rect">
+            <a:avLst/>
+          </a:prstGeom>
+          <a:noFill/>
+          <a:ln w="28575">
+            <a:solidFill>
+              <a:srgbClr val="C00000"/>
+            </a:solidFill>
+            <a:prstDash val="sysDash"/>
+          </a:ln>
+        </p:spPr>
+        <p:style>
+          <a:lnRef idx="2">
+            <a:schemeClr val="accent1">
+              <a:shade val="15000"/>
+            </a:schemeClr>
+          </a:lnRef>
+          <a:fillRef idx="1">
+            <a:schemeClr val="accent1"/>
+          </a:fillRef>
+          <a:effectRef idx="0">
+            <a:schemeClr val="accent1"/>
+          </a:effectRef>
+          <a:fontRef idx="minor">
+            <a:schemeClr val="lt1"/>
+          </a:fontRef>
+        </p:style>
+        <p:txBody>
+          <a:bodyPr rtlCol="0" anchor="ctr"/>
+          <a:lstStyle/>
+          <a:p>
+            <a:pPr algn="ctr"/>
+            <a:endParaRPr lang="en-SG" dirty="0"/>
+          </a:p>
+        </p:txBody>
+      </p:sp>
+      <p:cxnSp>
+        <p:nvCxnSpPr>
+          <p:cNvPr id="16" name="Straight Arrow Connector 15">
+            <a:extLst>
+              <a:ext uri="{FF2B5EF4-FFF2-40B4-BE49-F238E27FC236}">
+                <a16:creationId xmlns:a16="http://schemas.microsoft.com/office/drawing/2014/main" id="{179D217D-352D-8D7D-C164-519763C829F9}"/>
+              </a:ext>
+            </a:extLst>
+          </p:cNvPr>
+          <p:cNvCxnSpPr>
+            <a:cxnSpLocks/>
+            <a:stCxn id="14" idx="1"/>
+          </p:cNvCxnSpPr>
+          <p:nvPr/>
+        </p:nvCxnSpPr>
+        <p:spPr>
+          <a:xfrm flipH="1" flipV="1">
+            <a:off x="5538217" y="4574550"/>
+            <a:ext cx="1210055" cy="1"/>
+          </a:xfrm>
+          <a:prstGeom prst="straightConnector1">
+            <a:avLst/>
+          </a:prstGeom>
+          <a:ln>
+            <a:solidFill>
+              <a:srgbClr val="C00000"/>
+            </a:solidFill>
+            <a:tailEnd type="triangle"/>
+          </a:ln>
+        </p:spPr>
+        <p:style>
+          <a:lnRef idx="2">
+            <a:schemeClr val="accent1"/>
+          </a:lnRef>
+          <a:fillRef idx="0">
+            <a:schemeClr val="accent1"/>
+          </a:fillRef>
+          <a:effectRef idx="1">
+            <a:schemeClr val="accent1"/>
+          </a:effectRef>
+          <a:fontRef idx="minor">
+            <a:schemeClr val="tx1"/>
+          </a:fontRef>
+        </p:style>
+      </p:cxnSp>
+      <p:sp>
+        <p:nvSpPr>
+          <p:cNvPr id="20" name="TextBox 19">
+            <a:extLst>
+              <a:ext uri="{FF2B5EF4-FFF2-40B4-BE49-F238E27FC236}">
+                <a16:creationId xmlns:a16="http://schemas.microsoft.com/office/drawing/2014/main" id="{7B9CBF59-5558-8341-689A-F7171321B42D}"/>
+              </a:ext>
+            </a:extLst>
+          </p:cNvPr>
+          <p:cNvSpPr txBox="1"/>
+          <p:nvPr/>
+        </p:nvSpPr>
+        <p:spPr>
+          <a:xfrm>
+            <a:off x="4743389" y="1004982"/>
+            <a:ext cx="2396896" cy="584775"/>
+          </a:xfrm>
+          <a:prstGeom prst="rect">
+            <a:avLst/>
+          </a:prstGeom>
+          <a:noFill/>
+        </p:spPr>
+        <p:txBody>
+          <a:bodyPr wrap="square">
+            <a:spAutoFit/>
+          </a:bodyPr>
+          <a:lstStyle/>
+          <a:p>
+            <a:r>
+              <a:rPr lang="en-US" sz="1600" b="1" dirty="0">
+                <a:solidFill>
+                  <a:schemeClr val="accent6">
+                    <a:lumMod val="75000"/>
+                  </a:schemeClr>
+                </a:solidFill>
+              </a:rPr>
+              <a:t>Find the API Function and use correctly </a:t>
+            </a:r>
+            <a:endParaRPr lang="en-SG" sz="1600" b="1" dirty="0">
+              <a:solidFill>
+                <a:schemeClr val="accent6">
+                  <a:lumMod val="75000"/>
+                </a:schemeClr>
+              </a:solidFill>
+            </a:endParaRPr>
+          </a:p>
+        </p:txBody>
+      </p:sp>
+      <p:sp>
+        <p:nvSpPr>
+          <p:cNvPr id="21" name="TextBox 20">
+            <a:extLst>
+              <a:ext uri="{FF2B5EF4-FFF2-40B4-BE49-F238E27FC236}">
+                <a16:creationId xmlns:a16="http://schemas.microsoft.com/office/drawing/2014/main" id="{C0C61336-0BF6-8CF3-4A5E-42F434658ED6}"/>
+              </a:ext>
+            </a:extLst>
+          </p:cNvPr>
+          <p:cNvSpPr txBox="1"/>
+          <p:nvPr/>
+        </p:nvSpPr>
+        <p:spPr>
+          <a:xfrm>
+            <a:off x="5206977" y="4789207"/>
+            <a:ext cx="1847671" cy="1077218"/>
+          </a:xfrm>
+          <a:prstGeom prst="rect">
+            <a:avLst/>
+          </a:prstGeom>
+          <a:noFill/>
+        </p:spPr>
+        <p:txBody>
+          <a:bodyPr wrap="square">
+            <a:spAutoFit/>
+          </a:bodyPr>
+          <a:lstStyle/>
+          <a:p>
+            <a:r>
+              <a:rPr lang="en-US" sz="1600" b="1" dirty="0">
+                <a:solidFill>
+                  <a:srgbClr val="C00000"/>
+                </a:solidFill>
+              </a:rPr>
+              <a:t>Find the API Function but didn’t use correctly</a:t>
+            </a:r>
+            <a:endParaRPr lang="en-SG" sz="1600" b="1" dirty="0">
+              <a:solidFill>
+                <a:srgbClr val="C00000"/>
+              </a:solidFill>
+            </a:endParaRPr>
+          </a:p>
+        </p:txBody>
+      </p:sp>
+    </p:spTree>
+    <p:extLst>
+      <p:ext uri="{BB962C8B-B14F-4D97-AF65-F5344CB8AC3E}">
+        <p14:creationId xmlns:p14="http://schemas.microsoft.com/office/powerpoint/2010/main" val="1981014788"/>
+      </p:ext>
+    </p:extLst>
+  </p:cSld>
+  <p:clrMapOvr>
+    <a:masterClrMapping/>
+  </p:clrMapOvr>
+</p:sld>
+</file>
+
 <file path=ppt/theme/theme1.xml><?xml version="1.0" encoding="utf-8"?>
 <a:theme xmlns:a="http://schemas.openxmlformats.org/drawingml/2006/main" name="Office Theme">
   <a:themeElements>

</xml_diff>

<commit_message>
Added the table of contents and added the title image
</commit_message>
<xml_diff>
--- a/others/LocalDeepSeekWithRAG/img/designDoc.pptx
+++ b/others/LocalDeepSeekWithRAG/img/designDoc.pptx
@@ -5,8 +5,9 @@
     <p:sldMasterId id="2147483648" r:id="rId1"/>
   </p:sldMasterIdLst>
   <p:sldIdLst>
-    <p:sldId id="256" r:id="rId2"/>
-    <p:sldId id="257" r:id="rId3"/>
+    <p:sldId id="258" r:id="rId2"/>
+    <p:sldId id="256" r:id="rId3"/>
+    <p:sldId id="257" r:id="rId4"/>
   </p:sldIdLst>
   <p:sldSz cx="12192000" cy="6858000"/>
   <p:notesSz cx="6858000" cy="9144000"/>
@@ -262,7 +263,7 @@
           <a:p>
             <a:fld id="{0391740C-F5DB-44C2-ADD2-87011C5594EF}" type="datetimeFigureOut">
               <a:rPr lang="en-SG" smtClean="0"/>
-              <a:t>8/2/2025</a:t>
+              <a:t>9/2/2025</a:t>
             </a:fld>
             <a:endParaRPr lang="en-SG"/>
           </a:p>
@@ -462,7 +463,7 @@
           <a:p>
             <a:fld id="{0391740C-F5DB-44C2-ADD2-87011C5594EF}" type="datetimeFigureOut">
               <a:rPr lang="en-SG" smtClean="0"/>
-              <a:t>8/2/2025</a:t>
+              <a:t>9/2/2025</a:t>
             </a:fld>
             <a:endParaRPr lang="en-SG"/>
           </a:p>
@@ -672,7 +673,7 @@
           <a:p>
             <a:fld id="{0391740C-F5DB-44C2-ADD2-87011C5594EF}" type="datetimeFigureOut">
               <a:rPr lang="en-SG" smtClean="0"/>
-              <a:t>8/2/2025</a:t>
+              <a:t>9/2/2025</a:t>
             </a:fld>
             <a:endParaRPr lang="en-SG"/>
           </a:p>
@@ -872,7 +873,7 @@
           <a:p>
             <a:fld id="{0391740C-F5DB-44C2-ADD2-87011C5594EF}" type="datetimeFigureOut">
               <a:rPr lang="en-SG" smtClean="0"/>
-              <a:t>8/2/2025</a:t>
+              <a:t>9/2/2025</a:t>
             </a:fld>
             <a:endParaRPr lang="en-SG"/>
           </a:p>
@@ -1148,7 +1149,7 @@
           <a:p>
             <a:fld id="{0391740C-F5DB-44C2-ADD2-87011C5594EF}" type="datetimeFigureOut">
               <a:rPr lang="en-SG" smtClean="0"/>
-              <a:t>8/2/2025</a:t>
+              <a:t>9/2/2025</a:t>
             </a:fld>
             <a:endParaRPr lang="en-SG"/>
           </a:p>
@@ -1416,7 +1417,7 @@
           <a:p>
             <a:fld id="{0391740C-F5DB-44C2-ADD2-87011C5594EF}" type="datetimeFigureOut">
               <a:rPr lang="en-SG" smtClean="0"/>
-              <a:t>8/2/2025</a:t>
+              <a:t>9/2/2025</a:t>
             </a:fld>
             <a:endParaRPr lang="en-SG"/>
           </a:p>
@@ -1831,7 +1832,7 @@
           <a:p>
             <a:fld id="{0391740C-F5DB-44C2-ADD2-87011C5594EF}" type="datetimeFigureOut">
               <a:rPr lang="en-SG" smtClean="0"/>
-              <a:t>8/2/2025</a:t>
+              <a:t>9/2/2025</a:t>
             </a:fld>
             <a:endParaRPr lang="en-SG"/>
           </a:p>
@@ -1973,7 +1974,7 @@
           <a:p>
             <a:fld id="{0391740C-F5DB-44C2-ADD2-87011C5594EF}" type="datetimeFigureOut">
               <a:rPr lang="en-SG" smtClean="0"/>
-              <a:t>8/2/2025</a:t>
+              <a:t>9/2/2025</a:t>
             </a:fld>
             <a:endParaRPr lang="en-SG"/>
           </a:p>
@@ -2086,7 +2087,7 @@
           <a:p>
             <a:fld id="{0391740C-F5DB-44C2-ADD2-87011C5594EF}" type="datetimeFigureOut">
               <a:rPr lang="en-SG" smtClean="0"/>
-              <a:t>8/2/2025</a:t>
+              <a:t>9/2/2025</a:t>
             </a:fld>
             <a:endParaRPr lang="en-SG"/>
           </a:p>
@@ -2399,7 +2400,7 @@
           <a:p>
             <a:fld id="{0391740C-F5DB-44C2-ADD2-87011C5594EF}" type="datetimeFigureOut">
               <a:rPr lang="en-SG" smtClean="0"/>
-              <a:t>8/2/2025</a:t>
+              <a:t>9/2/2025</a:t>
             </a:fld>
             <a:endParaRPr lang="en-SG"/>
           </a:p>
@@ -2688,7 +2689,7 @@
           <a:p>
             <a:fld id="{0391740C-F5DB-44C2-ADD2-87011C5594EF}" type="datetimeFigureOut">
               <a:rPr lang="en-SG" smtClean="0"/>
-              <a:t>8/2/2025</a:t>
+              <a:t>9/2/2025</a:t>
             </a:fld>
             <a:endParaRPr lang="en-SG"/>
           </a:p>
@@ -2931,7 +2932,7 @@
           <a:p>
             <a:fld id="{0391740C-F5DB-44C2-ADD2-87011C5594EF}" type="datetimeFigureOut">
               <a:rPr lang="en-SG" smtClean="0"/>
-              <a:t>8/2/2025</a:t>
+              <a:t>9/2/2025</a:t>
             </a:fld>
             <a:endParaRPr lang="en-SG"/>
           </a:p>
@@ -3348,6 +3349,1108 @@
           <a:chExt cx="0" cy="0"/>
         </a:xfrm>
       </p:grpSpPr>
+      <p:sp>
+        <p:nvSpPr>
+          <p:cNvPr id="22" name="Rectangle 21">
+            <a:extLst>
+              <a:ext uri="{FF2B5EF4-FFF2-40B4-BE49-F238E27FC236}">
+                <a16:creationId xmlns:a16="http://schemas.microsoft.com/office/drawing/2014/main" id="{51DEA7FE-6F35-F44E-9FF5-41EE1049B257}"/>
+              </a:ext>
+            </a:extLst>
+          </p:cNvPr>
+          <p:cNvSpPr/>
+          <p:nvPr/>
+        </p:nvSpPr>
+        <p:spPr>
+          <a:xfrm>
+            <a:off x="3995928" y="1490472"/>
+            <a:ext cx="6144768" cy="3922776"/>
+          </a:xfrm>
+          <a:prstGeom prst="rect">
+            <a:avLst/>
+          </a:prstGeom>
+          <a:noFill/>
+        </p:spPr>
+        <p:style>
+          <a:lnRef idx="2">
+            <a:schemeClr val="accent1">
+              <a:shade val="15000"/>
+            </a:schemeClr>
+          </a:lnRef>
+          <a:fillRef idx="1">
+            <a:schemeClr val="accent1"/>
+          </a:fillRef>
+          <a:effectRef idx="0">
+            <a:schemeClr val="accent1"/>
+          </a:effectRef>
+          <a:fontRef idx="minor">
+            <a:schemeClr val="lt1"/>
+          </a:fontRef>
+        </p:style>
+        <p:txBody>
+          <a:bodyPr rtlCol="0" anchor="ctr"/>
+          <a:lstStyle/>
+          <a:p>
+            <a:pPr algn="ctr"/>
+            <a:endParaRPr lang="en-SG"/>
+          </a:p>
+        </p:txBody>
+      </p:sp>
+      <p:sp>
+        <p:nvSpPr>
+          <p:cNvPr id="21" name="Rectangle 20">
+            <a:extLst>
+              <a:ext uri="{FF2B5EF4-FFF2-40B4-BE49-F238E27FC236}">
+                <a16:creationId xmlns:a16="http://schemas.microsoft.com/office/drawing/2014/main" id="{FC1E1B28-1192-B9FD-3C08-1AA984C315B5}"/>
+              </a:ext>
+            </a:extLst>
+          </p:cNvPr>
+          <p:cNvSpPr/>
+          <p:nvPr/>
+        </p:nvSpPr>
+        <p:spPr>
+          <a:xfrm>
+            <a:off x="4420312" y="3758886"/>
+            <a:ext cx="4379976" cy="1334322"/>
+          </a:xfrm>
+          <a:prstGeom prst="rect">
+            <a:avLst/>
+          </a:prstGeom>
+          <a:solidFill>
+            <a:schemeClr val="accent6">
+              <a:lumMod val="40000"/>
+              <a:lumOff val="60000"/>
+            </a:schemeClr>
+          </a:solidFill>
+          <a:ln>
+            <a:prstDash val="sysDash"/>
+          </a:ln>
+        </p:spPr>
+        <p:style>
+          <a:lnRef idx="2">
+            <a:schemeClr val="accent1">
+              <a:shade val="15000"/>
+            </a:schemeClr>
+          </a:lnRef>
+          <a:fillRef idx="1">
+            <a:schemeClr val="accent1"/>
+          </a:fillRef>
+          <a:effectRef idx="0">
+            <a:schemeClr val="accent1"/>
+          </a:effectRef>
+          <a:fontRef idx="minor">
+            <a:schemeClr val="lt1"/>
+          </a:fontRef>
+        </p:style>
+        <p:txBody>
+          <a:bodyPr rtlCol="0" anchor="ctr"/>
+          <a:lstStyle/>
+          <a:p>
+            <a:pPr algn="ctr"/>
+            <a:endParaRPr lang="en-SG" dirty="0"/>
+          </a:p>
+        </p:txBody>
+      </p:sp>
+      <p:pic>
+        <p:nvPicPr>
+          <p:cNvPr id="1026" name="Picture 2" descr="DeepSeek Logo and symbol, meaning ...">
+            <a:extLst>
+              <a:ext uri="{FF2B5EF4-FFF2-40B4-BE49-F238E27FC236}">
+                <a16:creationId xmlns:a16="http://schemas.microsoft.com/office/drawing/2014/main" id="{2A910E59-A283-E0CD-8BAD-CE4EA0CA4608}"/>
+              </a:ext>
+            </a:extLst>
+          </p:cNvPr>
+          <p:cNvPicPr>
+            <a:picLocks noChangeAspect="1" noChangeArrowheads="1"/>
+          </p:cNvPicPr>
+          <p:nvPr/>
+        </p:nvPicPr>
+        <p:blipFill rotWithShape="1">
+          <a:blip r:embed="rId2">
+            <a:extLst>
+              <a:ext uri="{28A0092B-C50C-407E-A947-70E740481C1C}">
+                <a14:useLocalDpi xmlns:a14="http://schemas.microsoft.com/office/drawing/2010/main" val="0"/>
+              </a:ext>
+            </a:extLst>
+          </a:blip>
+          <a:srcRect t="17745" b="19385"/>
+          <a:stretch/>
+        </p:blipFill>
+        <p:spPr bwMode="auto">
+          <a:xfrm>
+            <a:off x="4588630" y="4099872"/>
+            <a:ext cx="2234452" cy="786683"/>
+          </a:xfrm>
+          <a:prstGeom prst="rect">
+            <a:avLst/>
+          </a:prstGeom>
+          <a:noFill/>
+          <a:ln w="19050">
+            <a:solidFill>
+              <a:schemeClr val="tx1"/>
+            </a:solidFill>
+          </a:ln>
+          <a:extLst>
+            <a:ext uri="{909E8E84-426E-40DD-AFC4-6F175D3DCCD1}">
+              <a14:hiddenFill xmlns:a14="http://schemas.microsoft.com/office/drawing/2010/main">
+                <a:solidFill>
+                  <a:srgbClr val="FFFFFF"/>
+                </a:solidFill>
+              </a14:hiddenFill>
+            </a:ext>
+          </a:extLst>
+        </p:spPr>
+      </p:pic>
+      <p:pic>
+        <p:nvPicPr>
+          <p:cNvPr id="1028" name="Picture 4" descr="Embed Text | Nomic Atlas Documentation">
+            <a:extLst>
+              <a:ext uri="{FF2B5EF4-FFF2-40B4-BE49-F238E27FC236}">
+                <a16:creationId xmlns:a16="http://schemas.microsoft.com/office/drawing/2014/main" id="{FDB66E18-DF98-3FEC-FE3C-BAD36B7102E2}"/>
+              </a:ext>
+            </a:extLst>
+          </p:cNvPr>
+          <p:cNvPicPr>
+            <a:picLocks noChangeAspect="1" noChangeArrowheads="1"/>
+          </p:cNvPicPr>
+          <p:nvPr/>
+        </p:nvPicPr>
+        <p:blipFill>
+          <a:blip r:embed="rId3">
+            <a:extLst>
+              <a:ext uri="{28A0092B-C50C-407E-A947-70E740481C1C}">
+                <a14:useLocalDpi xmlns:a14="http://schemas.microsoft.com/office/drawing/2010/main" val="0"/>
+              </a:ext>
+            </a:extLst>
+          </a:blip>
+          <a:srcRect/>
+          <a:stretch>
+            <a:fillRect/>
+          </a:stretch>
+        </p:blipFill>
+        <p:spPr bwMode="auto">
+          <a:xfrm>
+            <a:off x="7204434" y="4078425"/>
+            <a:ext cx="1112648" cy="786683"/>
+          </a:xfrm>
+          <a:prstGeom prst="rect">
+            <a:avLst/>
+          </a:prstGeom>
+          <a:noFill/>
+          <a:ln w="19050">
+            <a:solidFill>
+              <a:schemeClr val="tx1"/>
+            </a:solidFill>
+          </a:ln>
+          <a:extLst>
+            <a:ext uri="{909E8E84-426E-40DD-AFC4-6F175D3DCCD1}">
+              <a14:hiddenFill xmlns:a14="http://schemas.microsoft.com/office/drawing/2010/main">
+                <a:solidFill>
+                  <a:srgbClr val="FFFFFF"/>
+                </a:solidFill>
+              </a14:hiddenFill>
+            </a:ext>
+          </a:extLst>
+        </p:spPr>
+      </p:pic>
+      <p:pic>
+        <p:nvPicPr>
+          <p:cNvPr id="1030" name="Picture 6" descr="Run DeepSeek-R1 Locally for Free in Just 3 Minutes! - DEV Community">
+            <a:extLst>
+              <a:ext uri="{FF2B5EF4-FFF2-40B4-BE49-F238E27FC236}">
+                <a16:creationId xmlns:a16="http://schemas.microsoft.com/office/drawing/2014/main" id="{CB67419E-BD82-9244-FD1F-0BD24831ADDB}"/>
+              </a:ext>
+            </a:extLst>
+          </p:cNvPr>
+          <p:cNvPicPr>
+            <a:picLocks noChangeAspect="1" noChangeArrowheads="1"/>
+          </p:cNvPicPr>
+          <p:nvPr/>
+        </p:nvPicPr>
+        <p:blipFill>
+          <a:blip r:embed="rId4">
+            <a:extLst>
+              <a:ext uri="{28A0092B-C50C-407E-A947-70E740481C1C}">
+                <a14:useLocalDpi xmlns:a14="http://schemas.microsoft.com/office/drawing/2010/main" val="0"/>
+              </a:ext>
+            </a:extLst>
+          </a:blip>
+          <a:srcRect/>
+          <a:stretch>
+            <a:fillRect/>
+          </a:stretch>
+        </p:blipFill>
+        <p:spPr bwMode="auto">
+          <a:xfrm>
+            <a:off x="4520483" y="3166055"/>
+            <a:ext cx="1903917" cy="656851"/>
+          </a:xfrm>
+          <a:prstGeom prst="rect">
+            <a:avLst/>
+          </a:prstGeom>
+          <a:noFill/>
+          <a:extLst>
+            <a:ext uri="{909E8E84-426E-40DD-AFC4-6F175D3DCCD1}">
+              <a14:hiddenFill xmlns:a14="http://schemas.microsoft.com/office/drawing/2010/main">
+                <a:solidFill>
+                  <a:srgbClr val="FFFFFF"/>
+                </a:solidFill>
+              </a14:hiddenFill>
+            </a:ext>
+          </a:extLst>
+        </p:spPr>
+      </p:pic>
+      <p:pic>
+        <p:nvPicPr>
+          <p:cNvPr id="1032" name="Picture 8" descr="AnythingLLM - Open Source &amp; Private ChatGPT for PDF Docs?">
+            <a:extLst>
+              <a:ext uri="{FF2B5EF4-FFF2-40B4-BE49-F238E27FC236}">
+                <a16:creationId xmlns:a16="http://schemas.microsoft.com/office/drawing/2014/main" id="{4458CDBC-68F9-5512-2E37-DA6F68729A02}"/>
+              </a:ext>
+            </a:extLst>
+          </p:cNvPr>
+          <p:cNvPicPr>
+            <a:picLocks noChangeAspect="1" noChangeArrowheads="1"/>
+          </p:cNvPicPr>
+          <p:nvPr/>
+        </p:nvPicPr>
+        <p:blipFill>
+          <a:blip r:embed="rId5">
+            <a:extLst>
+              <a:ext uri="{28A0092B-C50C-407E-A947-70E740481C1C}">
+                <a14:useLocalDpi xmlns:a14="http://schemas.microsoft.com/office/drawing/2010/main" val="0"/>
+              </a:ext>
+            </a:extLst>
+          </a:blip>
+          <a:srcRect/>
+          <a:stretch>
+            <a:fillRect/>
+          </a:stretch>
+        </p:blipFill>
+        <p:spPr bwMode="auto">
+          <a:xfrm>
+            <a:off x="4375643" y="1852983"/>
+            <a:ext cx="2284686" cy="1286476"/>
+          </a:xfrm>
+          <a:prstGeom prst="rect">
+            <a:avLst/>
+          </a:prstGeom>
+          <a:noFill/>
+          <a:ln w="12700">
+            <a:solidFill>
+              <a:schemeClr val="tx1"/>
+            </a:solidFill>
+          </a:ln>
+          <a:extLst>
+            <a:ext uri="{909E8E84-426E-40DD-AFC4-6F175D3DCCD1}">
+              <a14:hiddenFill xmlns:a14="http://schemas.microsoft.com/office/drawing/2010/main">
+                <a:solidFill>
+                  <a:srgbClr val="FFFFFF"/>
+                </a:solidFill>
+              </a14:hiddenFill>
+            </a:ext>
+          </a:extLst>
+        </p:spPr>
+      </p:pic>
+      <p:pic>
+        <p:nvPicPr>
+          <p:cNvPr id="7" name="Picture 6">
+            <a:extLst>
+              <a:ext uri="{FF2B5EF4-FFF2-40B4-BE49-F238E27FC236}">
+                <a16:creationId xmlns:a16="http://schemas.microsoft.com/office/drawing/2014/main" id="{336C91B8-8003-6845-DF9E-F46D583EC8C9}"/>
+              </a:ext>
+            </a:extLst>
+          </p:cNvPr>
+          <p:cNvPicPr>
+            <a:picLocks noChangeAspect="1"/>
+          </p:cNvPicPr>
+          <p:nvPr/>
+        </p:nvPicPr>
+        <p:blipFill>
+          <a:blip r:embed="rId6"/>
+          <a:stretch>
+            <a:fillRect/>
+          </a:stretch>
+        </p:blipFill>
+        <p:spPr>
+          <a:xfrm>
+            <a:off x="7646655" y="1904006"/>
+            <a:ext cx="336995" cy="389344"/>
+          </a:xfrm>
+          <a:prstGeom prst="rect">
+            <a:avLst/>
+          </a:prstGeom>
+          <a:ln w="3175">
+            <a:solidFill>
+              <a:schemeClr val="tx1"/>
+            </a:solidFill>
+          </a:ln>
+        </p:spPr>
+      </p:pic>
+      <p:pic>
+        <p:nvPicPr>
+          <p:cNvPr id="8" name="Picture 7">
+            <a:extLst>
+              <a:ext uri="{FF2B5EF4-FFF2-40B4-BE49-F238E27FC236}">
+                <a16:creationId xmlns:a16="http://schemas.microsoft.com/office/drawing/2014/main" id="{9B98D2F2-A8EB-1807-257E-474ABC7C293B}"/>
+              </a:ext>
+            </a:extLst>
+          </p:cNvPr>
+          <p:cNvPicPr>
+            <a:picLocks noChangeAspect="1"/>
+          </p:cNvPicPr>
+          <p:nvPr/>
+        </p:nvPicPr>
+        <p:blipFill>
+          <a:blip r:embed="rId7"/>
+          <a:stretch>
+            <a:fillRect/>
+          </a:stretch>
+        </p:blipFill>
+        <p:spPr>
+          <a:xfrm>
+            <a:off x="7646655" y="2397077"/>
+            <a:ext cx="340677" cy="389345"/>
+          </a:xfrm>
+          <a:prstGeom prst="rect">
+            <a:avLst/>
+          </a:prstGeom>
+        </p:spPr>
+      </p:pic>
+      <p:pic>
+        <p:nvPicPr>
+          <p:cNvPr id="9" name="Picture 8">
+            <a:extLst>
+              <a:ext uri="{FF2B5EF4-FFF2-40B4-BE49-F238E27FC236}">
+                <a16:creationId xmlns:a16="http://schemas.microsoft.com/office/drawing/2014/main" id="{751A17EC-E212-FC11-614E-740CD988C3DA}"/>
+              </a:ext>
+            </a:extLst>
+          </p:cNvPr>
+          <p:cNvPicPr>
+            <a:picLocks noChangeAspect="1"/>
+          </p:cNvPicPr>
+          <p:nvPr/>
+        </p:nvPicPr>
+        <p:blipFill>
+          <a:blip r:embed="rId8"/>
+          <a:stretch>
+            <a:fillRect/>
+          </a:stretch>
+        </p:blipFill>
+        <p:spPr>
+          <a:xfrm>
+            <a:off x="8125854" y="2414847"/>
+            <a:ext cx="382456" cy="403851"/>
+          </a:xfrm>
+          <a:prstGeom prst="rect">
+            <a:avLst/>
+          </a:prstGeom>
+        </p:spPr>
+      </p:pic>
+      <p:pic>
+        <p:nvPicPr>
+          <p:cNvPr id="10" name="Picture 9">
+            <a:extLst>
+              <a:ext uri="{FF2B5EF4-FFF2-40B4-BE49-F238E27FC236}">
+                <a16:creationId xmlns:a16="http://schemas.microsoft.com/office/drawing/2014/main" id="{70EBD9EB-2875-4D0C-1465-F15EE2E52569}"/>
+              </a:ext>
+            </a:extLst>
+          </p:cNvPr>
+          <p:cNvPicPr>
+            <a:picLocks noChangeAspect="1"/>
+          </p:cNvPicPr>
+          <p:nvPr/>
+        </p:nvPicPr>
+        <p:blipFill>
+          <a:blip r:embed="rId9"/>
+          <a:stretch>
+            <a:fillRect/>
+          </a:stretch>
+        </p:blipFill>
+        <p:spPr>
+          <a:xfrm>
+            <a:off x="8592234" y="1889500"/>
+            <a:ext cx="519772" cy="330507"/>
+          </a:xfrm>
+          <a:prstGeom prst="rect">
+            <a:avLst/>
+          </a:prstGeom>
+        </p:spPr>
+      </p:pic>
+      <p:pic>
+        <p:nvPicPr>
+          <p:cNvPr id="11" name="Picture 2" descr="Json file - Free ui icons">
+            <a:extLst>
+              <a:ext uri="{FF2B5EF4-FFF2-40B4-BE49-F238E27FC236}">
+                <a16:creationId xmlns:a16="http://schemas.microsoft.com/office/drawing/2014/main" id="{5503BA7D-88EA-6391-9F33-F8C0DED198FD}"/>
+              </a:ext>
+            </a:extLst>
+          </p:cNvPr>
+          <p:cNvPicPr>
+            <a:picLocks noChangeAspect="1" noChangeArrowheads="1"/>
+          </p:cNvPicPr>
+          <p:nvPr/>
+        </p:nvPicPr>
+        <p:blipFill>
+          <a:blip r:embed="rId10">
+            <a:extLst>
+              <a:ext uri="{28A0092B-C50C-407E-A947-70E740481C1C}">
+                <a14:useLocalDpi xmlns:a14="http://schemas.microsoft.com/office/drawing/2010/main" val="0"/>
+              </a:ext>
+            </a:extLst>
+          </a:blip>
+          <a:srcRect/>
+          <a:stretch>
+            <a:fillRect/>
+          </a:stretch>
+        </p:blipFill>
+        <p:spPr bwMode="auto">
+          <a:xfrm>
+            <a:off x="9162062" y="1904006"/>
+            <a:ext cx="455312" cy="455312"/>
+          </a:xfrm>
+          <a:prstGeom prst="rect">
+            <a:avLst/>
+          </a:prstGeom>
+          <a:noFill/>
+          <a:extLst>
+            <a:ext uri="{909E8E84-426E-40DD-AFC4-6F175D3DCCD1}">
+              <a14:hiddenFill xmlns:a14="http://schemas.microsoft.com/office/drawing/2010/main">
+                <a:solidFill>
+                  <a:srgbClr val="FFFFFF"/>
+                </a:solidFill>
+              </a14:hiddenFill>
+            </a:ext>
+          </a:extLst>
+        </p:spPr>
+      </p:pic>
+      <p:pic>
+        <p:nvPicPr>
+          <p:cNvPr id="12" name="Picture 11">
+            <a:extLst>
+              <a:ext uri="{FF2B5EF4-FFF2-40B4-BE49-F238E27FC236}">
+                <a16:creationId xmlns:a16="http://schemas.microsoft.com/office/drawing/2014/main" id="{EE563111-5B0A-C006-1675-6D402E2F9BC8}"/>
+              </a:ext>
+            </a:extLst>
+          </p:cNvPr>
+          <p:cNvPicPr>
+            <a:picLocks noChangeAspect="1"/>
+          </p:cNvPicPr>
+          <p:nvPr/>
+        </p:nvPicPr>
+        <p:blipFill>
+          <a:blip r:embed="rId11"/>
+          <a:stretch>
+            <a:fillRect/>
+          </a:stretch>
+        </p:blipFill>
+        <p:spPr>
+          <a:xfrm>
+            <a:off x="9112898" y="2414847"/>
+            <a:ext cx="431471" cy="337087"/>
+          </a:xfrm>
+          <a:prstGeom prst="rect">
+            <a:avLst/>
+          </a:prstGeom>
+        </p:spPr>
+      </p:pic>
+      <p:pic>
+        <p:nvPicPr>
+          <p:cNvPr id="13" name="Picture 12">
+            <a:extLst>
+              <a:ext uri="{FF2B5EF4-FFF2-40B4-BE49-F238E27FC236}">
+                <a16:creationId xmlns:a16="http://schemas.microsoft.com/office/drawing/2014/main" id="{2AFD9356-6FC2-99A9-D9CD-1C053D4E98C3}"/>
+              </a:ext>
+            </a:extLst>
+          </p:cNvPr>
+          <p:cNvPicPr>
+            <a:picLocks noChangeAspect="1"/>
+          </p:cNvPicPr>
+          <p:nvPr/>
+        </p:nvPicPr>
+        <p:blipFill>
+          <a:blip r:embed="rId12"/>
+          <a:stretch>
+            <a:fillRect/>
+          </a:stretch>
+        </p:blipFill>
+        <p:spPr>
+          <a:xfrm>
+            <a:off x="8629950" y="2339026"/>
+            <a:ext cx="340677" cy="444594"/>
+          </a:xfrm>
+          <a:prstGeom prst="rect">
+            <a:avLst/>
+          </a:prstGeom>
+          <a:ln w="12700">
+            <a:solidFill>
+              <a:schemeClr val="tx1"/>
+            </a:solidFill>
+          </a:ln>
+        </p:spPr>
+      </p:pic>
+      <p:pic>
+        <p:nvPicPr>
+          <p:cNvPr id="14" name="Picture 13">
+            <a:extLst>
+              <a:ext uri="{FF2B5EF4-FFF2-40B4-BE49-F238E27FC236}">
+                <a16:creationId xmlns:a16="http://schemas.microsoft.com/office/drawing/2014/main" id="{2828887F-5349-D95B-F4C4-E8B01FDA5F8C}"/>
+              </a:ext>
+            </a:extLst>
+          </p:cNvPr>
+          <p:cNvPicPr>
+            <a:picLocks noChangeAspect="1"/>
+          </p:cNvPicPr>
+          <p:nvPr/>
+        </p:nvPicPr>
+        <p:blipFill>
+          <a:blip r:embed="rId13"/>
+          <a:stretch>
+            <a:fillRect/>
+          </a:stretch>
+        </p:blipFill>
+        <p:spPr>
+          <a:xfrm>
+            <a:off x="8078841" y="1869792"/>
+            <a:ext cx="417675" cy="423558"/>
+          </a:xfrm>
+          <a:prstGeom prst="rect">
+            <a:avLst/>
+          </a:prstGeom>
+        </p:spPr>
+      </p:pic>
+      <p:sp>
+        <p:nvSpPr>
+          <p:cNvPr id="15" name="Rectangle 14">
+            <a:extLst>
+              <a:ext uri="{FF2B5EF4-FFF2-40B4-BE49-F238E27FC236}">
+                <a16:creationId xmlns:a16="http://schemas.microsoft.com/office/drawing/2014/main" id="{B9D0912C-0FF8-DE75-1658-EE4EF55CFCFB}"/>
+              </a:ext>
+            </a:extLst>
+          </p:cNvPr>
+          <p:cNvSpPr/>
+          <p:nvPr/>
+        </p:nvSpPr>
+        <p:spPr>
+          <a:xfrm>
+            <a:off x="7580832" y="1777623"/>
+            <a:ext cx="2069211" cy="1130862"/>
+          </a:xfrm>
+          <a:prstGeom prst="rect">
+            <a:avLst/>
+          </a:prstGeom>
+          <a:noFill/>
+        </p:spPr>
+        <p:style>
+          <a:lnRef idx="2">
+            <a:schemeClr val="accent1">
+              <a:shade val="15000"/>
+            </a:schemeClr>
+          </a:lnRef>
+          <a:fillRef idx="1">
+            <a:schemeClr val="accent1"/>
+          </a:fillRef>
+          <a:effectRef idx="0">
+            <a:schemeClr val="accent1"/>
+          </a:effectRef>
+          <a:fontRef idx="minor">
+            <a:schemeClr val="lt1"/>
+          </a:fontRef>
+        </p:style>
+        <p:txBody>
+          <a:bodyPr rtlCol="0" anchor="ctr"/>
+          <a:lstStyle/>
+          <a:p>
+            <a:pPr algn="ctr"/>
+            <a:endParaRPr lang="en-SG"/>
+          </a:p>
+        </p:txBody>
+      </p:sp>
+      <p:sp>
+        <p:nvSpPr>
+          <p:cNvPr id="16" name="TextBox 15">
+            <a:extLst>
+              <a:ext uri="{FF2B5EF4-FFF2-40B4-BE49-F238E27FC236}">
+                <a16:creationId xmlns:a16="http://schemas.microsoft.com/office/drawing/2014/main" id="{25F3D2A8-4F1B-A5A2-2398-DAB13C537C6E}"/>
+              </a:ext>
+            </a:extLst>
+          </p:cNvPr>
+          <p:cNvSpPr txBox="1"/>
+          <p:nvPr/>
+        </p:nvSpPr>
+        <p:spPr>
+          <a:xfrm>
+            <a:off x="7439858" y="2935223"/>
+            <a:ext cx="2497388" cy="461665"/>
+          </a:xfrm>
+          <a:prstGeom prst="rect">
+            <a:avLst/>
+          </a:prstGeom>
+          <a:noFill/>
+        </p:spPr>
+        <p:txBody>
+          <a:bodyPr wrap="square" rtlCol="0">
+            <a:spAutoFit/>
+          </a:bodyPr>
+          <a:lstStyle/>
+          <a:p>
+            <a:r>
+              <a:rPr lang="en-US" sz="1200" b="1" dirty="0"/>
+              <a:t>Private data or data not included in pre-training knowledge</a:t>
+            </a:r>
+            <a:endParaRPr lang="en-SG" sz="1200" b="1" dirty="0"/>
+          </a:p>
+        </p:txBody>
+      </p:sp>
+      <p:sp>
+        <p:nvSpPr>
+          <p:cNvPr id="17" name="Arrow: Down 16">
+            <a:extLst>
+              <a:ext uri="{FF2B5EF4-FFF2-40B4-BE49-F238E27FC236}">
+                <a16:creationId xmlns:a16="http://schemas.microsoft.com/office/drawing/2014/main" id="{81718086-E582-7F4C-7949-F5728910440E}"/>
+              </a:ext>
+            </a:extLst>
+          </p:cNvPr>
+          <p:cNvSpPr/>
+          <p:nvPr/>
+        </p:nvSpPr>
+        <p:spPr>
+          <a:xfrm rot="5400000">
+            <a:off x="7009537" y="2308970"/>
+            <a:ext cx="181762" cy="676285"/>
+          </a:xfrm>
+          <a:prstGeom prst="downArrow">
+            <a:avLst/>
+          </a:prstGeom>
+        </p:spPr>
+        <p:style>
+          <a:lnRef idx="2">
+            <a:schemeClr val="accent1">
+              <a:shade val="15000"/>
+            </a:schemeClr>
+          </a:lnRef>
+          <a:fillRef idx="1">
+            <a:schemeClr val="accent1"/>
+          </a:fillRef>
+          <a:effectRef idx="0">
+            <a:schemeClr val="accent1"/>
+          </a:effectRef>
+          <a:fontRef idx="minor">
+            <a:schemeClr val="lt1"/>
+          </a:fontRef>
+        </p:style>
+        <p:txBody>
+          <a:bodyPr rtlCol="0" anchor="ctr"/>
+          <a:lstStyle/>
+          <a:p>
+            <a:pPr algn="ctr"/>
+            <a:endParaRPr lang="en-SG"/>
+          </a:p>
+        </p:txBody>
+      </p:sp>
+      <p:sp>
+        <p:nvSpPr>
+          <p:cNvPr id="18" name="TextBox 17">
+            <a:extLst>
+              <a:ext uri="{FF2B5EF4-FFF2-40B4-BE49-F238E27FC236}">
+                <a16:creationId xmlns:a16="http://schemas.microsoft.com/office/drawing/2014/main" id="{53F848BF-E6DD-5DBF-A79D-8A67464A96C9}"/>
+              </a:ext>
+            </a:extLst>
+          </p:cNvPr>
+          <p:cNvSpPr txBox="1"/>
+          <p:nvPr/>
+        </p:nvSpPr>
+        <p:spPr>
+          <a:xfrm>
+            <a:off x="6736758" y="2137848"/>
+            <a:ext cx="1069422" cy="276999"/>
+          </a:xfrm>
+          <a:prstGeom prst="rect">
+            <a:avLst/>
+          </a:prstGeom>
+          <a:noFill/>
+        </p:spPr>
+        <p:txBody>
+          <a:bodyPr wrap="square" rtlCol="0">
+            <a:spAutoFit/>
+          </a:bodyPr>
+          <a:lstStyle/>
+          <a:p>
+            <a:r>
+              <a:rPr lang="en-US" sz="1200" b="1" dirty="0"/>
+              <a:t>Embed</a:t>
+            </a:r>
+            <a:endParaRPr lang="en-SG" sz="1200" b="1" dirty="0"/>
+          </a:p>
+        </p:txBody>
+      </p:sp>
+      <p:sp>
+        <p:nvSpPr>
+          <p:cNvPr id="20" name="Arrow: Up 19">
+            <a:extLst>
+              <a:ext uri="{FF2B5EF4-FFF2-40B4-BE49-F238E27FC236}">
+                <a16:creationId xmlns:a16="http://schemas.microsoft.com/office/drawing/2014/main" id="{F42D33A5-552A-7D55-DB28-4D7021C388D7}"/>
+              </a:ext>
+            </a:extLst>
+          </p:cNvPr>
+          <p:cNvSpPr/>
+          <p:nvPr/>
+        </p:nvSpPr>
+        <p:spPr>
+          <a:xfrm>
+            <a:off x="5524646" y="3166055"/>
+            <a:ext cx="181210" cy="230833"/>
+          </a:xfrm>
+          <a:prstGeom prst="upArrow">
+            <a:avLst/>
+          </a:prstGeom>
+        </p:spPr>
+        <p:style>
+          <a:lnRef idx="2">
+            <a:schemeClr val="accent6">
+              <a:shade val="15000"/>
+            </a:schemeClr>
+          </a:lnRef>
+          <a:fillRef idx="1">
+            <a:schemeClr val="accent6"/>
+          </a:fillRef>
+          <a:effectRef idx="0">
+            <a:schemeClr val="accent6"/>
+          </a:effectRef>
+          <a:fontRef idx="minor">
+            <a:schemeClr val="lt1"/>
+          </a:fontRef>
+        </p:style>
+        <p:txBody>
+          <a:bodyPr rtlCol="0" anchor="ctr"/>
+          <a:lstStyle/>
+          <a:p>
+            <a:pPr algn="ctr"/>
+            <a:endParaRPr lang="en-SG"/>
+          </a:p>
+        </p:txBody>
+      </p:sp>
+      <p:sp>
+        <p:nvSpPr>
+          <p:cNvPr id="23" name="TextBox 22">
+            <a:extLst>
+              <a:ext uri="{FF2B5EF4-FFF2-40B4-BE49-F238E27FC236}">
+                <a16:creationId xmlns:a16="http://schemas.microsoft.com/office/drawing/2014/main" id="{44B8B344-536E-B2AF-A91D-EEDBAC0140BA}"/>
+              </a:ext>
+            </a:extLst>
+          </p:cNvPr>
+          <p:cNvSpPr txBox="1"/>
+          <p:nvPr/>
+        </p:nvSpPr>
+        <p:spPr>
+          <a:xfrm>
+            <a:off x="1519563" y="3945983"/>
+            <a:ext cx="667512" cy="307777"/>
+          </a:xfrm>
+          <a:prstGeom prst="rect">
+            <a:avLst/>
+          </a:prstGeom>
+          <a:noFill/>
+        </p:spPr>
+        <p:txBody>
+          <a:bodyPr wrap="square" rtlCol="0">
+            <a:spAutoFit/>
+          </a:bodyPr>
+          <a:lstStyle/>
+          <a:p>
+            <a:r>
+              <a:rPr lang="en-US" sz="1400" b="1" dirty="0"/>
+              <a:t>User</a:t>
+            </a:r>
+            <a:endParaRPr lang="en-SG" sz="1400" b="1" dirty="0"/>
+          </a:p>
+        </p:txBody>
+      </p:sp>
+      <p:pic>
+        <p:nvPicPr>
+          <p:cNvPr id="25" name="Picture 24" descr="A screenshot of a computer&#10;&#10;AI-generated content may be incorrect.">
+            <a:extLst>
+              <a:ext uri="{FF2B5EF4-FFF2-40B4-BE49-F238E27FC236}">
+                <a16:creationId xmlns:a16="http://schemas.microsoft.com/office/drawing/2014/main" id="{3FF264C4-441B-2287-9028-B660F58AB3AA}"/>
+              </a:ext>
+            </a:extLst>
+          </p:cNvPr>
+          <p:cNvPicPr>
+            <a:picLocks noChangeAspect="1"/>
+          </p:cNvPicPr>
+          <p:nvPr/>
+        </p:nvPicPr>
+        <p:blipFill>
+          <a:blip r:embed="rId14">
+            <a:extLst>
+              <a:ext uri="{28A0092B-C50C-407E-A947-70E740481C1C}">
+                <a14:useLocalDpi xmlns:a14="http://schemas.microsoft.com/office/drawing/2010/main" val="0"/>
+              </a:ext>
+            </a:extLst>
+          </a:blip>
+          <a:stretch>
+            <a:fillRect/>
+          </a:stretch>
+        </p:blipFill>
+        <p:spPr>
+          <a:xfrm>
+            <a:off x="1466672" y="1930213"/>
+            <a:ext cx="2196795" cy="1691640"/>
+          </a:xfrm>
+          <a:prstGeom prst="rect">
+            <a:avLst/>
+          </a:prstGeom>
+          <a:ln w="12700">
+            <a:solidFill>
+              <a:schemeClr val="tx1"/>
+            </a:solidFill>
+          </a:ln>
+        </p:spPr>
+      </p:pic>
+      <p:pic>
+        <p:nvPicPr>
+          <p:cNvPr id="4" name="Graphic 3" descr="User with solid fill">
+            <a:extLst>
+              <a:ext uri="{FF2B5EF4-FFF2-40B4-BE49-F238E27FC236}">
+                <a16:creationId xmlns:a16="http://schemas.microsoft.com/office/drawing/2014/main" id="{8194E910-6A80-AE9B-197F-C859498FD8D3}"/>
+              </a:ext>
+            </a:extLst>
+          </p:cNvPr>
+          <p:cNvPicPr>
+            <a:picLocks noChangeAspect="1"/>
+          </p:cNvPicPr>
+          <p:nvPr/>
+        </p:nvPicPr>
+        <p:blipFill>
+          <a:blip r:embed="rId15">
+            <a:extLst>
+              <a:ext uri="{96DAC541-7B7A-43D3-8B79-37D633B846F1}">
+                <asvg:svgBlip xmlns:asvg="http://schemas.microsoft.com/office/drawing/2016/SVG/main" r:embed="rId16"/>
+              </a:ext>
+            </a:extLst>
+          </a:blip>
+          <a:stretch>
+            <a:fillRect/>
+          </a:stretch>
+        </p:blipFill>
+        <p:spPr>
+          <a:xfrm>
+            <a:off x="1455446" y="3394842"/>
+            <a:ext cx="683583" cy="683583"/>
+          </a:xfrm>
+          <a:prstGeom prst="rect">
+            <a:avLst/>
+          </a:prstGeom>
+        </p:spPr>
+      </p:pic>
+      <p:sp>
+        <p:nvSpPr>
+          <p:cNvPr id="26" name="Arrow: Left-Right 25">
+            <a:extLst>
+              <a:ext uri="{FF2B5EF4-FFF2-40B4-BE49-F238E27FC236}">
+                <a16:creationId xmlns:a16="http://schemas.microsoft.com/office/drawing/2014/main" id="{D6BF1EEF-C9AD-BB21-5EBF-60F4EAC7F830}"/>
+              </a:ext>
+            </a:extLst>
+          </p:cNvPr>
+          <p:cNvSpPr/>
+          <p:nvPr/>
+        </p:nvSpPr>
+        <p:spPr>
+          <a:xfrm>
+            <a:off x="3739896" y="2414847"/>
+            <a:ext cx="530073" cy="141384"/>
+          </a:xfrm>
+          <a:prstGeom prst="leftRightArrow">
+            <a:avLst/>
+          </a:prstGeom>
+        </p:spPr>
+        <p:style>
+          <a:lnRef idx="2">
+            <a:schemeClr val="accent1">
+              <a:shade val="15000"/>
+            </a:schemeClr>
+          </a:lnRef>
+          <a:fillRef idx="1">
+            <a:schemeClr val="accent1"/>
+          </a:fillRef>
+          <a:effectRef idx="0">
+            <a:schemeClr val="accent1"/>
+          </a:effectRef>
+          <a:fontRef idx="minor">
+            <a:schemeClr val="lt1"/>
+          </a:fontRef>
+        </p:style>
+        <p:txBody>
+          <a:bodyPr rtlCol="0" anchor="ctr"/>
+          <a:lstStyle/>
+          <a:p>
+            <a:pPr algn="ctr"/>
+            <a:endParaRPr lang="en-SG"/>
+          </a:p>
+        </p:txBody>
+      </p:sp>
+      <p:sp>
+        <p:nvSpPr>
+          <p:cNvPr id="27" name="TextBox 26">
+            <a:extLst>
+              <a:ext uri="{FF2B5EF4-FFF2-40B4-BE49-F238E27FC236}">
+                <a16:creationId xmlns:a16="http://schemas.microsoft.com/office/drawing/2014/main" id="{C4FBEE4B-480B-B6CA-2B2B-E1312FD96E97}"/>
+              </a:ext>
+            </a:extLst>
+          </p:cNvPr>
+          <p:cNvSpPr txBox="1"/>
+          <p:nvPr/>
+        </p:nvSpPr>
+        <p:spPr>
+          <a:xfrm>
+            <a:off x="1400935" y="1597061"/>
+            <a:ext cx="2005787" cy="338554"/>
+          </a:xfrm>
+          <a:prstGeom prst="rect">
+            <a:avLst/>
+          </a:prstGeom>
+          <a:noFill/>
+        </p:spPr>
+        <p:txBody>
+          <a:bodyPr wrap="square">
+            <a:spAutoFit/>
+          </a:bodyPr>
+          <a:lstStyle/>
+          <a:p>
+            <a:r>
+              <a:rPr lang="en-US" sz="1600" b="1" dirty="0">
+                <a:solidFill>
+                  <a:schemeClr val="accent6">
+                    <a:lumMod val="75000"/>
+                  </a:schemeClr>
+                </a:solidFill>
+              </a:rPr>
+              <a:t>Anything LLM Chat</a:t>
+            </a:r>
+            <a:endParaRPr lang="en-SG" sz="1600" b="1" dirty="0">
+              <a:solidFill>
+                <a:schemeClr val="accent6">
+                  <a:lumMod val="75000"/>
+                </a:schemeClr>
+              </a:solidFill>
+            </a:endParaRPr>
+          </a:p>
+        </p:txBody>
+      </p:sp>
+      <p:sp>
+        <p:nvSpPr>
+          <p:cNvPr id="28" name="TextBox 27">
+            <a:extLst>
+              <a:ext uri="{FF2B5EF4-FFF2-40B4-BE49-F238E27FC236}">
+                <a16:creationId xmlns:a16="http://schemas.microsoft.com/office/drawing/2014/main" id="{A5A13333-2D8D-7C2B-34BA-771A1B689A1A}"/>
+              </a:ext>
+            </a:extLst>
+          </p:cNvPr>
+          <p:cNvSpPr txBox="1"/>
+          <p:nvPr/>
+        </p:nvSpPr>
+        <p:spPr>
+          <a:xfrm>
+            <a:off x="3995928" y="1439069"/>
+            <a:ext cx="2005787" cy="338554"/>
+          </a:xfrm>
+          <a:prstGeom prst="rect">
+            <a:avLst/>
+          </a:prstGeom>
+          <a:noFill/>
+        </p:spPr>
+        <p:txBody>
+          <a:bodyPr wrap="square">
+            <a:spAutoFit/>
+          </a:bodyPr>
+          <a:lstStyle/>
+          <a:p>
+            <a:r>
+              <a:rPr lang="en-US" sz="1600" b="1" dirty="0"/>
+              <a:t>Local PC/Server</a:t>
+            </a:r>
+            <a:endParaRPr lang="en-SG" sz="1600" b="1" dirty="0"/>
+          </a:p>
+        </p:txBody>
+      </p:sp>
+      <p:sp>
+        <p:nvSpPr>
+          <p:cNvPr id="29" name="TextBox 28">
+            <a:extLst>
+              <a:ext uri="{FF2B5EF4-FFF2-40B4-BE49-F238E27FC236}">
+                <a16:creationId xmlns:a16="http://schemas.microsoft.com/office/drawing/2014/main" id="{4921A4A5-0276-8232-B8F0-3FBAA224251B}"/>
+              </a:ext>
+            </a:extLst>
+          </p:cNvPr>
+          <p:cNvSpPr txBox="1"/>
+          <p:nvPr/>
+        </p:nvSpPr>
+        <p:spPr>
+          <a:xfrm>
+            <a:off x="1455446" y="893558"/>
+            <a:ext cx="8685249" cy="400110"/>
+          </a:xfrm>
+          <a:prstGeom prst="rect">
+            <a:avLst/>
+          </a:prstGeom>
+          <a:noFill/>
+          <a:ln w="19050">
+            <a:solidFill>
+              <a:schemeClr val="tx1"/>
+            </a:solidFill>
+            <a:prstDash val="sysDash"/>
+          </a:ln>
+        </p:spPr>
+        <p:txBody>
+          <a:bodyPr wrap="square">
+            <a:spAutoFit/>
+          </a:bodyPr>
+          <a:lstStyle/>
+          <a:p>
+            <a:r>
+              <a:rPr lang="en-US" sz="2000" b="1" dirty="0"/>
+              <a:t>Deploying DeepSeek-R1 Locally with a Custom RAG Knowledge Base</a:t>
+            </a:r>
+            <a:endParaRPr lang="en-SG" sz="2000" b="1" dirty="0">
+              <a:solidFill>
+                <a:schemeClr val="accent6">
+                  <a:lumMod val="75000"/>
+                </a:schemeClr>
+              </a:solidFill>
+            </a:endParaRPr>
+          </a:p>
+        </p:txBody>
+      </p:sp>
+    </p:spTree>
+    <p:extLst>
+      <p:ext uri="{BB962C8B-B14F-4D97-AF65-F5344CB8AC3E}">
+        <p14:creationId xmlns:p14="http://schemas.microsoft.com/office/powerpoint/2010/main" val="3256016728"/>
+      </p:ext>
+    </p:extLst>
+  </p:cSld>
+  <p:clrMapOvr>
+    <a:masterClrMapping/>
+  </p:clrMapOvr>
+</p:sld>
+</file>
+
+<file path=ppt/slides/slide2.xml><?xml version="1.0" encoding="utf-8"?>
+<p:sld xmlns:a="http://schemas.openxmlformats.org/drawingml/2006/main" xmlns:r="http://schemas.openxmlformats.org/officeDocument/2006/relationships" xmlns:p="http://schemas.openxmlformats.org/presentationml/2006/main">
+  <p:cSld>
+    <p:spTree>
+      <p:nvGrpSpPr>
+        <p:cNvPr id="1" name=""/>
+        <p:cNvGrpSpPr/>
+        <p:nvPr/>
+      </p:nvGrpSpPr>
+      <p:grpSpPr>
+        <a:xfrm>
+          <a:off x="0" y="0"/>
+          <a:ext cx="0" cy="0"/>
+          <a:chOff x="0" y="0"/>
+          <a:chExt cx="0" cy="0"/>
+        </a:xfrm>
+      </p:grpSpPr>
       <p:pic>
         <p:nvPicPr>
           <p:cNvPr id="5" name="Graphic 4" descr="User with solid fill">
@@ -5378,7 +6481,7 @@
 </p:sld>
 </file>
 
-<file path=ppt/slides/slide2.xml><?xml version="1.0" encoding="utf-8"?>
+<file path=ppt/slides/slide3.xml><?xml version="1.0" encoding="utf-8"?>
 <p:sld xmlns:a="http://schemas.openxmlformats.org/drawingml/2006/main" xmlns:r="http://schemas.openxmlformats.org/officeDocument/2006/relationships" xmlns:p="http://schemas.openxmlformats.org/presentationml/2006/main">
   <p:cSld>
     <p:spTree>

</xml_diff>

<commit_message>
Update the design document and title image.
</commit_message>
<xml_diff>
--- a/others/LocalDeepSeekWithRAG/img/designDoc.pptx
+++ b/others/LocalDeepSeekWithRAG/img/designDoc.pptx
@@ -3980,8 +3980,8 @@
         </p:nvSpPr>
         <p:spPr>
           <a:xfrm>
-            <a:off x="7439858" y="2935223"/>
-            <a:ext cx="2497388" cy="461665"/>
+            <a:off x="6823082" y="2935223"/>
+            <a:ext cx="3114164" cy="830997"/>
           </a:xfrm>
           <a:prstGeom prst="rect">
             <a:avLst/>
@@ -3995,10 +3995,10 @@
           <a:lstStyle/>
           <a:p>
             <a:r>
-              <a:rPr lang="en-US" sz="1200" b="1" dirty="0"/>
+              <a:rPr lang="en-US" sz="1600" b="1" dirty="0"/>
               <a:t>Private data or data not included in pre-training knowledge</a:t>
             </a:r>
-            <a:endParaRPr lang="en-SG" sz="1200" b="1" dirty="0"/>
+            <a:endParaRPr lang="en-SG" sz="1600" b="1" dirty="0"/>
           </a:p>
         </p:txBody>
       </p:sp>
@@ -4144,7 +4144,7 @@
         </p:nvSpPr>
         <p:spPr>
           <a:xfrm>
-            <a:off x="1519563" y="3945983"/>
+            <a:off x="1648973" y="5145206"/>
             <a:ext cx="667512" cy="307777"/>
           </a:xfrm>
           <a:prstGeom prst="rect">
@@ -4235,7 +4235,7 @@
         </p:blipFill>
         <p:spPr>
           <a:xfrm>
-            <a:off x="1455446" y="3394842"/>
+            <a:off x="1589320" y="4625655"/>
             <a:ext cx="683583" cy="683583"/>
           </a:xfrm>
           <a:prstGeom prst="rect">
@@ -4409,7 +4409,7 @@
           <a:p>
             <a:r>
               <a:rPr lang="en-US" sz="2000" b="1" dirty="0"/>
-              <a:t>Deploying DeepSeek-R1 Locally with a Custom RAG Knowledge Base</a:t>
+              <a:t>Deploying DeepSeek-R1 Locally with a Custom RAG Knowledge Data Base</a:t>
             </a:r>
             <a:endParaRPr lang="en-SG" sz="2000" b="1" dirty="0">
               <a:solidFill>
@@ -4418,6 +4418,302 @@
                 </a:schemeClr>
               </a:solidFill>
             </a:endParaRPr>
+          </a:p>
+        </p:txBody>
+      </p:sp>
+      <p:pic>
+        <p:nvPicPr>
+          <p:cNvPr id="3" name="Graphic 2" descr="Computer with solid fill">
+            <a:extLst>
+              <a:ext uri="{FF2B5EF4-FFF2-40B4-BE49-F238E27FC236}">
+                <a16:creationId xmlns:a16="http://schemas.microsoft.com/office/drawing/2014/main" id="{DC36C675-7765-DC89-5B9A-E95925E7A4F0}"/>
+              </a:ext>
+            </a:extLst>
+          </p:cNvPr>
+          <p:cNvPicPr>
+            <a:picLocks noChangeAspect="1"/>
+          </p:cNvPicPr>
+          <p:nvPr/>
+        </p:nvPicPr>
+        <p:blipFill>
+          <a:blip r:embed="rId17">
+            <a:extLst>
+              <a:ext uri="{96DAC541-7B7A-43D3-8B79-37D633B846F1}">
+                <asvg:svgBlip xmlns:asvg="http://schemas.microsoft.com/office/drawing/2016/SVG/main" r:embed="rId18"/>
+              </a:ext>
+            </a:extLst>
+          </a:blip>
+          <a:stretch>
+            <a:fillRect/>
+          </a:stretch>
+        </p:blipFill>
+        <p:spPr>
+          <a:xfrm>
+            <a:off x="9146063" y="4537163"/>
+            <a:ext cx="914400" cy="914400"/>
+          </a:xfrm>
+          <a:prstGeom prst="rect">
+            <a:avLst/>
+          </a:prstGeom>
+        </p:spPr>
+      </p:pic>
+      <p:pic>
+        <p:nvPicPr>
+          <p:cNvPr id="5" name="Graphic 4" descr="User with solid fill">
+            <a:extLst>
+              <a:ext uri="{FF2B5EF4-FFF2-40B4-BE49-F238E27FC236}">
+                <a16:creationId xmlns:a16="http://schemas.microsoft.com/office/drawing/2014/main" id="{F823C45E-82A6-4454-0B19-AD12E3DCD96B}"/>
+              </a:ext>
+            </a:extLst>
+          </p:cNvPr>
+          <p:cNvPicPr>
+            <a:picLocks noChangeAspect="1"/>
+          </p:cNvPicPr>
+          <p:nvPr/>
+        </p:nvPicPr>
+        <p:blipFill>
+          <a:blip r:embed="rId15">
+            <a:extLst>
+              <a:ext uri="{96DAC541-7B7A-43D3-8B79-37D633B846F1}">
+                <asvg:svgBlip xmlns:asvg="http://schemas.microsoft.com/office/drawing/2016/SVG/main" r:embed="rId16"/>
+              </a:ext>
+            </a:extLst>
+          </a:blip>
+          <a:stretch>
+            <a:fillRect/>
+          </a:stretch>
+        </p:blipFill>
+        <p:spPr>
+          <a:xfrm>
+            <a:off x="2723139" y="4615512"/>
+            <a:ext cx="683583" cy="683583"/>
+          </a:xfrm>
+          <a:prstGeom prst="rect">
+            <a:avLst/>
+          </a:prstGeom>
+        </p:spPr>
+      </p:pic>
+      <p:sp>
+        <p:nvSpPr>
+          <p:cNvPr id="6" name="TextBox 5">
+            <a:extLst>
+              <a:ext uri="{FF2B5EF4-FFF2-40B4-BE49-F238E27FC236}">
+                <a16:creationId xmlns:a16="http://schemas.microsoft.com/office/drawing/2014/main" id="{C6E6DB46-0E4D-AE45-1AF1-9F4F64E04816}"/>
+              </a:ext>
+            </a:extLst>
+          </p:cNvPr>
+          <p:cNvSpPr txBox="1"/>
+          <p:nvPr/>
+        </p:nvSpPr>
+        <p:spPr>
+          <a:xfrm>
+            <a:off x="2819600" y="5155854"/>
+            <a:ext cx="667512" cy="307777"/>
+          </a:xfrm>
+          <a:prstGeom prst="rect">
+            <a:avLst/>
+          </a:prstGeom>
+          <a:noFill/>
+        </p:spPr>
+        <p:txBody>
+          <a:bodyPr wrap="square" rtlCol="0">
+            <a:spAutoFit/>
+          </a:bodyPr>
+          <a:lstStyle/>
+          <a:p>
+            <a:r>
+              <a:rPr lang="en-US" sz="1400" b="1" dirty="0"/>
+              <a:t>User</a:t>
+            </a:r>
+            <a:endParaRPr lang="en-SG" sz="1400" b="1" dirty="0"/>
+          </a:p>
+        </p:txBody>
+      </p:sp>
+      <p:pic>
+        <p:nvPicPr>
+          <p:cNvPr id="30" name="Picture 29">
+            <a:extLst>
+              <a:ext uri="{FF2B5EF4-FFF2-40B4-BE49-F238E27FC236}">
+                <a16:creationId xmlns:a16="http://schemas.microsoft.com/office/drawing/2014/main" id="{19F36C73-A1E7-FE5F-FFD7-7A80945C369D}"/>
+              </a:ext>
+            </a:extLst>
+          </p:cNvPr>
+          <p:cNvPicPr>
+            <a:picLocks noChangeAspect="1"/>
+          </p:cNvPicPr>
+          <p:nvPr/>
+        </p:nvPicPr>
+        <p:blipFill>
+          <a:blip r:embed="rId19"/>
+          <a:stretch>
+            <a:fillRect/>
+          </a:stretch>
+        </p:blipFill>
+        <p:spPr>
+          <a:xfrm>
+            <a:off x="1559641" y="3451860"/>
+            <a:ext cx="842582" cy="796954"/>
+          </a:xfrm>
+          <a:prstGeom prst="rect">
+            <a:avLst/>
+          </a:prstGeom>
+        </p:spPr>
+      </p:pic>
+      <p:sp>
+        <p:nvSpPr>
+          <p:cNvPr id="31" name="Arrow: Left-Right 30">
+            <a:extLst>
+              <a:ext uri="{FF2B5EF4-FFF2-40B4-BE49-F238E27FC236}">
+                <a16:creationId xmlns:a16="http://schemas.microsoft.com/office/drawing/2014/main" id="{F880FC69-A1B0-2200-5DD7-7CE8460E51B9}"/>
+              </a:ext>
+            </a:extLst>
+          </p:cNvPr>
+          <p:cNvSpPr/>
+          <p:nvPr/>
+        </p:nvSpPr>
+        <p:spPr>
+          <a:xfrm rot="5400000">
+            <a:off x="1795755" y="4402688"/>
+            <a:ext cx="307779" cy="138155"/>
+          </a:xfrm>
+          <a:prstGeom prst="leftRightArrow">
+            <a:avLst/>
+          </a:prstGeom>
+        </p:spPr>
+        <p:style>
+          <a:lnRef idx="2">
+            <a:schemeClr val="accent1">
+              <a:shade val="15000"/>
+            </a:schemeClr>
+          </a:lnRef>
+          <a:fillRef idx="1">
+            <a:schemeClr val="accent1"/>
+          </a:fillRef>
+          <a:effectRef idx="0">
+            <a:schemeClr val="accent1"/>
+          </a:effectRef>
+          <a:fontRef idx="minor">
+            <a:schemeClr val="lt1"/>
+          </a:fontRef>
+        </p:style>
+        <p:txBody>
+          <a:bodyPr rtlCol="0" anchor="ctr"/>
+          <a:lstStyle/>
+          <a:p>
+            <a:pPr algn="ctr"/>
+            <a:endParaRPr lang="en-SG"/>
+          </a:p>
+        </p:txBody>
+      </p:sp>
+      <p:pic>
+        <p:nvPicPr>
+          <p:cNvPr id="33" name="Picture 32">
+            <a:extLst>
+              <a:ext uri="{FF2B5EF4-FFF2-40B4-BE49-F238E27FC236}">
+                <a16:creationId xmlns:a16="http://schemas.microsoft.com/office/drawing/2014/main" id="{1C0490FD-D669-EF4C-756F-861CCD85FA0D}"/>
+              </a:ext>
+            </a:extLst>
+          </p:cNvPr>
+          <p:cNvPicPr>
+            <a:picLocks noChangeAspect="1"/>
+          </p:cNvPicPr>
+          <p:nvPr/>
+        </p:nvPicPr>
+        <p:blipFill>
+          <a:blip r:embed="rId20"/>
+          <a:stretch>
+            <a:fillRect/>
+          </a:stretch>
+        </p:blipFill>
+        <p:spPr>
+          <a:xfrm>
+            <a:off x="2661084" y="3469616"/>
+            <a:ext cx="851638" cy="785602"/>
+          </a:xfrm>
+          <a:prstGeom prst="rect">
+            <a:avLst/>
+          </a:prstGeom>
+        </p:spPr>
+      </p:pic>
+      <p:sp>
+        <p:nvSpPr>
+          <p:cNvPr id="34" name="Arrow: Left-Right 33">
+            <a:extLst>
+              <a:ext uri="{FF2B5EF4-FFF2-40B4-BE49-F238E27FC236}">
+                <a16:creationId xmlns:a16="http://schemas.microsoft.com/office/drawing/2014/main" id="{26A91FC6-1B63-3E76-2019-3FD5F4901F69}"/>
+              </a:ext>
+            </a:extLst>
+          </p:cNvPr>
+          <p:cNvSpPr/>
+          <p:nvPr/>
+        </p:nvSpPr>
+        <p:spPr>
+          <a:xfrm rot="5400000">
+            <a:off x="2892508" y="4389977"/>
+            <a:ext cx="307779" cy="138155"/>
+          </a:xfrm>
+          <a:prstGeom prst="leftRightArrow">
+            <a:avLst/>
+          </a:prstGeom>
+        </p:spPr>
+        <p:style>
+          <a:lnRef idx="2">
+            <a:schemeClr val="accent1">
+              <a:shade val="15000"/>
+            </a:schemeClr>
+          </a:lnRef>
+          <a:fillRef idx="1">
+            <a:schemeClr val="accent1"/>
+          </a:fillRef>
+          <a:effectRef idx="0">
+            <a:schemeClr val="accent1"/>
+          </a:effectRef>
+          <a:fontRef idx="minor">
+            <a:schemeClr val="lt1"/>
+          </a:fontRef>
+        </p:style>
+        <p:txBody>
+          <a:bodyPr rtlCol="0" anchor="ctr"/>
+          <a:lstStyle/>
+          <a:p>
+            <a:pPr algn="ctr"/>
+            <a:endParaRPr lang="en-SG"/>
+          </a:p>
+        </p:txBody>
+      </p:sp>
+      <p:sp>
+        <p:nvSpPr>
+          <p:cNvPr id="35" name="TextBox 34">
+            <a:extLst>
+              <a:ext uri="{FF2B5EF4-FFF2-40B4-BE49-F238E27FC236}">
+                <a16:creationId xmlns:a16="http://schemas.microsoft.com/office/drawing/2014/main" id="{197952C0-A920-5259-7F81-D010304F4868}"/>
+              </a:ext>
+            </a:extLst>
+          </p:cNvPr>
+          <p:cNvSpPr txBox="1"/>
+          <p:nvPr/>
+        </p:nvSpPr>
+        <p:spPr>
+          <a:xfrm>
+            <a:off x="4366557" y="5069319"/>
+            <a:ext cx="2497388" cy="338554"/>
+          </a:xfrm>
+          <a:prstGeom prst="rect">
+            <a:avLst/>
+          </a:prstGeom>
+          <a:noFill/>
+        </p:spPr>
+        <p:txBody>
+          <a:bodyPr wrap="square" rtlCol="0">
+            <a:spAutoFit/>
+          </a:bodyPr>
+          <a:lstStyle/>
+          <a:p>
+            <a:r>
+              <a:rPr lang="en-US" sz="1600" b="1" dirty="0"/>
+              <a:t>Local LLM Models</a:t>
+            </a:r>
+            <a:endParaRPr lang="en-SG" sz="1600" b="1" dirty="0"/>
           </a:p>
         </p:txBody>
       </p:sp>

</xml_diff>